<commit_message>
Control signals have been added for 4 DUTs.
</commit_message>
<xml_diff>
--- a/0090_ber/rtl/schematic/parallel_send.pptx
+++ b/0090_ber/rtl/schematic/parallel_send.pptx
@@ -2,7 +2,7 @@
 <file path=ppt/presentation.xml><?xml version="1.0" encoding="utf-8"?>
 <p:presentation xmlns:a="http://schemas.openxmlformats.org/drawingml/2006/main" xmlns:r="http://schemas.openxmlformats.org/officeDocument/2006/relationships" xmlns:p="http://schemas.openxmlformats.org/presentationml/2006/main" saveSubsetFonts="1">
   <p:sldMasterIdLst>
-    <p:sldMasterId id="2147484429" r:id="rId1"/>
+    <p:sldMasterId id="2147484453" r:id="rId1"/>
   </p:sldMasterIdLst>
   <p:notesMasterIdLst>
     <p:notesMasterId r:id="rId3"/>
@@ -16,7 +16,7 @@
     <a:defPPr>
       <a:defRPr lang="en-US"/>
     </a:defPPr>
-    <a:lvl1pPr marL="0" algn="l" defTabSz="5640098" rtl="0" eaLnBrk="1" latinLnBrk="0" hangingPunct="1">
+    <a:lvl1pPr marL="0" algn="l" defTabSz="5639760" rtl="0" eaLnBrk="1" latinLnBrk="0" hangingPunct="1">
       <a:defRPr sz="11100" kern="1200">
         <a:solidFill>
           <a:schemeClr val="tx1"/>
@@ -26,7 +26,7 @@
         <a:cs typeface="+mn-cs"/>
       </a:defRPr>
     </a:lvl1pPr>
-    <a:lvl2pPr marL="2820045" algn="l" defTabSz="5640098" rtl="0" eaLnBrk="1" latinLnBrk="0" hangingPunct="1">
+    <a:lvl2pPr marL="2819876" algn="l" defTabSz="5639760" rtl="0" eaLnBrk="1" latinLnBrk="0" hangingPunct="1">
       <a:defRPr sz="11100" kern="1200">
         <a:solidFill>
           <a:schemeClr val="tx1"/>
@@ -36,7 +36,7 @@
         <a:cs typeface="+mn-cs"/>
       </a:defRPr>
     </a:lvl2pPr>
-    <a:lvl3pPr marL="5640098" algn="l" defTabSz="5640098" rtl="0" eaLnBrk="1" latinLnBrk="0" hangingPunct="1">
+    <a:lvl3pPr marL="5639760" algn="l" defTabSz="5639760" rtl="0" eaLnBrk="1" latinLnBrk="0" hangingPunct="1">
       <a:defRPr sz="11100" kern="1200">
         <a:solidFill>
           <a:schemeClr val="tx1"/>
@@ -46,7 +46,7 @@
         <a:cs typeface="+mn-cs"/>
       </a:defRPr>
     </a:lvl3pPr>
-    <a:lvl4pPr marL="8460147" algn="l" defTabSz="5640098" rtl="0" eaLnBrk="1" latinLnBrk="0" hangingPunct="1">
+    <a:lvl4pPr marL="8459639" algn="l" defTabSz="5639760" rtl="0" eaLnBrk="1" latinLnBrk="0" hangingPunct="1">
       <a:defRPr sz="11100" kern="1200">
         <a:solidFill>
           <a:schemeClr val="tx1"/>
@@ -56,7 +56,7 @@
         <a:cs typeface="+mn-cs"/>
       </a:defRPr>
     </a:lvl4pPr>
-    <a:lvl5pPr marL="11280179" algn="l" defTabSz="5640098" rtl="0" eaLnBrk="1" latinLnBrk="0" hangingPunct="1">
+    <a:lvl5pPr marL="11279502" algn="l" defTabSz="5639760" rtl="0" eaLnBrk="1" latinLnBrk="0" hangingPunct="1">
       <a:defRPr sz="11100" kern="1200">
         <a:solidFill>
           <a:schemeClr val="tx1"/>
@@ -66,7 +66,7 @@
         <a:cs typeface="+mn-cs"/>
       </a:defRPr>
     </a:lvl5pPr>
-    <a:lvl6pPr marL="14100237" algn="l" defTabSz="5640098" rtl="0" eaLnBrk="1" latinLnBrk="0" hangingPunct="1">
+    <a:lvl6pPr marL="14099391" algn="l" defTabSz="5639760" rtl="0" eaLnBrk="1" latinLnBrk="0" hangingPunct="1">
       <a:defRPr sz="11100" kern="1200">
         <a:solidFill>
           <a:schemeClr val="tx1"/>
@@ -76,7 +76,7 @@
         <a:cs typeface="+mn-cs"/>
       </a:defRPr>
     </a:lvl6pPr>
-    <a:lvl7pPr marL="16920282" algn="l" defTabSz="5640098" rtl="0" eaLnBrk="1" latinLnBrk="0" hangingPunct="1">
+    <a:lvl7pPr marL="16919267" algn="l" defTabSz="5639760" rtl="0" eaLnBrk="1" latinLnBrk="0" hangingPunct="1">
       <a:defRPr sz="11100" kern="1200">
         <a:solidFill>
           <a:schemeClr val="tx1"/>
@@ -86,7 +86,7 @@
         <a:cs typeface="+mn-cs"/>
       </a:defRPr>
     </a:lvl7pPr>
-    <a:lvl8pPr marL="19740331" algn="l" defTabSz="5640098" rtl="0" eaLnBrk="1" latinLnBrk="0" hangingPunct="1">
+    <a:lvl8pPr marL="19739147" algn="l" defTabSz="5639760" rtl="0" eaLnBrk="1" latinLnBrk="0" hangingPunct="1">
       <a:defRPr sz="11100" kern="1200">
         <a:solidFill>
           <a:schemeClr val="tx1"/>
@@ -96,7 +96,7 @@
         <a:cs typeface="+mn-cs"/>
       </a:defRPr>
     </a:lvl8pPr>
-    <a:lvl9pPr marL="22560371" algn="l" defTabSz="5640098" rtl="0" eaLnBrk="1" latinLnBrk="0" hangingPunct="1">
+    <a:lvl9pPr marL="22559018" algn="l" defTabSz="5639760" rtl="0" eaLnBrk="1" latinLnBrk="0" hangingPunct="1">
       <a:defRPr sz="11100" kern="1200">
         <a:solidFill>
           <a:schemeClr val="tx1"/>
@@ -197,7 +197,7 @@
           <a:p>
             <a:fld id="{B9E5BF02-4A65-43B2-AA51-912306618617}" type="datetimeFigureOut">
               <a:rPr lang="en-US" smtClean="0"/>
-              <a:t>9/25/2017</a:t>
+              <a:t>10/12/2017</a:t>
             </a:fld>
             <a:endParaRPr lang="en-US"/>
           </a:p>
@@ -371,8 +371,8 @@
   </p:cSld>
   <p:clrMap bg1="lt1" tx1="dk1" bg2="lt2" tx2="dk2" accent1="accent1" accent2="accent2" accent3="accent3" accent4="accent4" accent5="accent5" accent6="accent6" hlink="hlink" folHlink="folHlink"/>
   <p:notesStyle>
-    <a:lvl1pPr marL="0" algn="l" defTabSz="5640098" rtl="0" eaLnBrk="1" latinLnBrk="0" hangingPunct="1">
-      <a:defRPr sz="7401" kern="1200">
+    <a:lvl1pPr marL="0" algn="l" defTabSz="5639760" rtl="0" eaLnBrk="1" latinLnBrk="0" hangingPunct="1">
+      <a:defRPr sz="7400" kern="1200">
         <a:solidFill>
           <a:schemeClr val="tx1"/>
         </a:solidFill>
@@ -381,8 +381,8 @@
         <a:cs typeface="+mn-cs"/>
       </a:defRPr>
     </a:lvl1pPr>
-    <a:lvl2pPr marL="2820045" algn="l" defTabSz="5640098" rtl="0" eaLnBrk="1" latinLnBrk="0" hangingPunct="1">
-      <a:defRPr sz="7401" kern="1200">
+    <a:lvl2pPr marL="2819876" algn="l" defTabSz="5639760" rtl="0" eaLnBrk="1" latinLnBrk="0" hangingPunct="1">
+      <a:defRPr sz="7400" kern="1200">
         <a:solidFill>
           <a:schemeClr val="tx1"/>
         </a:solidFill>
@@ -391,8 +391,8 @@
         <a:cs typeface="+mn-cs"/>
       </a:defRPr>
     </a:lvl2pPr>
-    <a:lvl3pPr marL="5640098" algn="l" defTabSz="5640098" rtl="0" eaLnBrk="1" latinLnBrk="0" hangingPunct="1">
-      <a:defRPr sz="7401" kern="1200">
+    <a:lvl3pPr marL="5639760" algn="l" defTabSz="5639760" rtl="0" eaLnBrk="1" latinLnBrk="0" hangingPunct="1">
+      <a:defRPr sz="7400" kern="1200">
         <a:solidFill>
           <a:schemeClr val="tx1"/>
         </a:solidFill>
@@ -401,8 +401,8 @@
         <a:cs typeface="+mn-cs"/>
       </a:defRPr>
     </a:lvl3pPr>
-    <a:lvl4pPr marL="8460147" algn="l" defTabSz="5640098" rtl="0" eaLnBrk="1" latinLnBrk="0" hangingPunct="1">
-      <a:defRPr sz="7401" kern="1200">
+    <a:lvl4pPr marL="8459639" algn="l" defTabSz="5639760" rtl="0" eaLnBrk="1" latinLnBrk="0" hangingPunct="1">
+      <a:defRPr sz="7400" kern="1200">
         <a:solidFill>
           <a:schemeClr val="tx1"/>
         </a:solidFill>
@@ -411,8 +411,8 @@
         <a:cs typeface="+mn-cs"/>
       </a:defRPr>
     </a:lvl4pPr>
-    <a:lvl5pPr marL="11280179" algn="l" defTabSz="5640098" rtl="0" eaLnBrk="1" latinLnBrk="0" hangingPunct="1">
-      <a:defRPr sz="7401" kern="1200">
+    <a:lvl5pPr marL="11279502" algn="l" defTabSz="5639760" rtl="0" eaLnBrk="1" latinLnBrk="0" hangingPunct="1">
+      <a:defRPr sz="7400" kern="1200">
         <a:solidFill>
           <a:schemeClr val="tx1"/>
         </a:solidFill>
@@ -421,8 +421,8 @@
         <a:cs typeface="+mn-cs"/>
       </a:defRPr>
     </a:lvl5pPr>
-    <a:lvl6pPr marL="14100237" algn="l" defTabSz="5640098" rtl="0" eaLnBrk="1" latinLnBrk="0" hangingPunct="1">
-      <a:defRPr sz="7401" kern="1200">
+    <a:lvl6pPr marL="14099391" algn="l" defTabSz="5639760" rtl="0" eaLnBrk="1" latinLnBrk="0" hangingPunct="1">
+      <a:defRPr sz="7400" kern="1200">
         <a:solidFill>
           <a:schemeClr val="tx1"/>
         </a:solidFill>
@@ -431,8 +431,8 @@
         <a:cs typeface="+mn-cs"/>
       </a:defRPr>
     </a:lvl6pPr>
-    <a:lvl7pPr marL="16920282" algn="l" defTabSz="5640098" rtl="0" eaLnBrk="1" latinLnBrk="0" hangingPunct="1">
-      <a:defRPr sz="7401" kern="1200">
+    <a:lvl7pPr marL="16919267" algn="l" defTabSz="5639760" rtl="0" eaLnBrk="1" latinLnBrk="0" hangingPunct="1">
+      <a:defRPr sz="7400" kern="1200">
         <a:solidFill>
           <a:schemeClr val="tx1"/>
         </a:solidFill>
@@ -441,8 +441,8 @@
         <a:cs typeface="+mn-cs"/>
       </a:defRPr>
     </a:lvl7pPr>
-    <a:lvl8pPr marL="19740331" algn="l" defTabSz="5640098" rtl="0" eaLnBrk="1" latinLnBrk="0" hangingPunct="1">
-      <a:defRPr sz="7401" kern="1200">
+    <a:lvl8pPr marL="19739147" algn="l" defTabSz="5639760" rtl="0" eaLnBrk="1" latinLnBrk="0" hangingPunct="1">
+      <a:defRPr sz="7400" kern="1200">
         <a:solidFill>
           <a:schemeClr val="tx1"/>
         </a:solidFill>
@@ -451,8 +451,8 @@
         <a:cs typeface="+mn-cs"/>
       </a:defRPr>
     </a:lvl8pPr>
-    <a:lvl9pPr marL="22560371" algn="l" defTabSz="5640098" rtl="0" eaLnBrk="1" latinLnBrk="0" hangingPunct="1">
-      <a:defRPr sz="7401" kern="1200">
+    <a:lvl9pPr marL="22559018" algn="l" defTabSz="5639760" rtl="0" eaLnBrk="1" latinLnBrk="0" hangingPunct="1">
+      <a:defRPr sz="7400" kern="1200">
         <a:solidFill>
           <a:schemeClr val="tx1"/>
         </a:solidFill>
@@ -685,7 +685,7 @@
           <a:p>
             <a:fld id="{F8F920B2-3E99-4C9D-9450-62A3DEC5476B}" type="datetimeFigureOut">
               <a:rPr lang="en-US" smtClean="0"/>
-              <a:t>9/25/2017</a:t>
+              <a:t>10/12/2017</a:t>
             </a:fld>
             <a:endParaRPr lang="en-US"/>
           </a:p>
@@ -736,7 +736,7 @@
     </p:spTree>
     <p:extLst>
       <p:ext uri="{BB962C8B-B14F-4D97-AF65-F5344CB8AC3E}">
-        <p14:creationId xmlns:p14="http://schemas.microsoft.com/office/powerpoint/2010/main" val="486941304"/>
+        <p14:creationId xmlns:p14="http://schemas.microsoft.com/office/powerpoint/2010/main" val="3831764335"/>
       </p:ext>
     </p:extLst>
   </p:cSld>
@@ -855,7 +855,7 @@
           <a:p>
             <a:fld id="{F8F920B2-3E99-4C9D-9450-62A3DEC5476B}" type="datetimeFigureOut">
               <a:rPr lang="en-US" smtClean="0"/>
-              <a:t>9/25/2017</a:t>
+              <a:t>10/12/2017</a:t>
             </a:fld>
             <a:endParaRPr lang="en-US"/>
           </a:p>
@@ -906,7 +906,7 @@
     </p:spTree>
     <p:extLst>
       <p:ext uri="{BB962C8B-B14F-4D97-AF65-F5344CB8AC3E}">
-        <p14:creationId xmlns:p14="http://schemas.microsoft.com/office/powerpoint/2010/main" val="3859842152"/>
+        <p14:creationId xmlns:p14="http://schemas.microsoft.com/office/powerpoint/2010/main" val="3178044911"/>
       </p:ext>
     </p:extLst>
   </p:cSld>
@@ -1035,7 +1035,7 @@
           <a:p>
             <a:fld id="{F8F920B2-3E99-4C9D-9450-62A3DEC5476B}" type="datetimeFigureOut">
               <a:rPr lang="en-US" smtClean="0"/>
-              <a:t>9/25/2017</a:t>
+              <a:t>10/12/2017</a:t>
             </a:fld>
             <a:endParaRPr lang="en-US"/>
           </a:p>
@@ -1086,7 +1086,7 @@
     </p:spTree>
     <p:extLst>
       <p:ext uri="{BB962C8B-B14F-4D97-AF65-F5344CB8AC3E}">
-        <p14:creationId xmlns:p14="http://schemas.microsoft.com/office/powerpoint/2010/main" val="1174515872"/>
+        <p14:creationId xmlns:p14="http://schemas.microsoft.com/office/powerpoint/2010/main" val="2831046965"/>
       </p:ext>
     </p:extLst>
   </p:cSld>
@@ -1205,7 +1205,7 @@
           <a:p>
             <a:fld id="{F8F920B2-3E99-4C9D-9450-62A3DEC5476B}" type="datetimeFigureOut">
               <a:rPr lang="en-US" smtClean="0"/>
-              <a:t>9/25/2017</a:t>
+              <a:t>10/12/2017</a:t>
             </a:fld>
             <a:endParaRPr lang="en-US"/>
           </a:p>
@@ -1256,7 +1256,7 @@
     </p:spTree>
     <p:extLst>
       <p:ext uri="{BB962C8B-B14F-4D97-AF65-F5344CB8AC3E}">
-        <p14:creationId xmlns:p14="http://schemas.microsoft.com/office/powerpoint/2010/main" val="3776519715"/>
+        <p14:creationId xmlns:p14="http://schemas.microsoft.com/office/powerpoint/2010/main" val="3888854373"/>
       </p:ext>
     </p:extLst>
   </p:cSld>
@@ -1449,7 +1449,7 @@
           <a:p>
             <a:fld id="{F8F920B2-3E99-4C9D-9450-62A3DEC5476B}" type="datetimeFigureOut">
               <a:rPr lang="en-US" smtClean="0"/>
-              <a:t>9/25/2017</a:t>
+              <a:t>10/12/2017</a:t>
             </a:fld>
             <a:endParaRPr lang="en-US"/>
           </a:p>
@@ -1500,7 +1500,7 @@
     </p:spTree>
     <p:extLst>
       <p:ext uri="{BB962C8B-B14F-4D97-AF65-F5344CB8AC3E}">
-        <p14:creationId xmlns:p14="http://schemas.microsoft.com/office/powerpoint/2010/main" val="1885132501"/>
+        <p14:creationId xmlns:p14="http://schemas.microsoft.com/office/powerpoint/2010/main" val="2036669705"/>
       </p:ext>
     </p:extLst>
   </p:cSld>
@@ -1681,7 +1681,7 @@
           <a:p>
             <a:fld id="{F8F920B2-3E99-4C9D-9450-62A3DEC5476B}" type="datetimeFigureOut">
               <a:rPr lang="en-US" smtClean="0"/>
-              <a:t>9/25/2017</a:t>
+              <a:t>10/12/2017</a:t>
             </a:fld>
             <a:endParaRPr lang="en-US"/>
           </a:p>
@@ -1732,7 +1732,7 @@
     </p:spTree>
     <p:extLst>
       <p:ext uri="{BB962C8B-B14F-4D97-AF65-F5344CB8AC3E}">
-        <p14:creationId xmlns:p14="http://schemas.microsoft.com/office/powerpoint/2010/main" val="3188972862"/>
+        <p14:creationId xmlns:p14="http://schemas.microsoft.com/office/powerpoint/2010/main" val="4005262167"/>
       </p:ext>
     </p:extLst>
   </p:cSld>
@@ -2048,7 +2048,7 @@
           <a:p>
             <a:fld id="{F8F920B2-3E99-4C9D-9450-62A3DEC5476B}" type="datetimeFigureOut">
               <a:rPr lang="en-US" smtClean="0"/>
-              <a:t>9/25/2017</a:t>
+              <a:t>10/12/2017</a:t>
             </a:fld>
             <a:endParaRPr lang="en-US"/>
           </a:p>
@@ -2099,7 +2099,7 @@
     </p:spTree>
     <p:extLst>
       <p:ext uri="{BB962C8B-B14F-4D97-AF65-F5344CB8AC3E}">
-        <p14:creationId xmlns:p14="http://schemas.microsoft.com/office/powerpoint/2010/main" val="2246448390"/>
+        <p14:creationId xmlns:p14="http://schemas.microsoft.com/office/powerpoint/2010/main" val="4273548546"/>
       </p:ext>
     </p:extLst>
   </p:cSld>
@@ -2166,7 +2166,7 @@
           <a:p>
             <a:fld id="{F8F920B2-3E99-4C9D-9450-62A3DEC5476B}" type="datetimeFigureOut">
               <a:rPr lang="en-US" smtClean="0"/>
-              <a:t>9/25/2017</a:t>
+              <a:t>10/12/2017</a:t>
             </a:fld>
             <a:endParaRPr lang="en-US"/>
           </a:p>
@@ -2217,7 +2217,7 @@
     </p:spTree>
     <p:extLst>
       <p:ext uri="{BB962C8B-B14F-4D97-AF65-F5344CB8AC3E}">
-        <p14:creationId xmlns:p14="http://schemas.microsoft.com/office/powerpoint/2010/main" val="3359854892"/>
+        <p14:creationId xmlns:p14="http://schemas.microsoft.com/office/powerpoint/2010/main" val="511234307"/>
       </p:ext>
     </p:extLst>
   </p:cSld>
@@ -2261,7 +2261,7 @@
           <a:p>
             <a:fld id="{F8F920B2-3E99-4C9D-9450-62A3DEC5476B}" type="datetimeFigureOut">
               <a:rPr lang="en-US" smtClean="0"/>
-              <a:t>9/25/2017</a:t>
+              <a:t>10/12/2017</a:t>
             </a:fld>
             <a:endParaRPr lang="en-US"/>
           </a:p>
@@ -2312,7 +2312,7 @@
     </p:spTree>
     <p:extLst>
       <p:ext uri="{BB962C8B-B14F-4D97-AF65-F5344CB8AC3E}">
-        <p14:creationId xmlns:p14="http://schemas.microsoft.com/office/powerpoint/2010/main" val="2314631598"/>
+        <p14:creationId xmlns:p14="http://schemas.microsoft.com/office/powerpoint/2010/main" val="65267520"/>
       </p:ext>
     </p:extLst>
   </p:cSld>
@@ -2538,7 +2538,7 @@
           <a:p>
             <a:fld id="{F8F920B2-3E99-4C9D-9450-62A3DEC5476B}" type="datetimeFigureOut">
               <a:rPr lang="en-US" smtClean="0"/>
-              <a:t>9/25/2017</a:t>
+              <a:t>10/12/2017</a:t>
             </a:fld>
             <a:endParaRPr lang="en-US"/>
           </a:p>
@@ -2589,7 +2589,7 @@
     </p:spTree>
     <p:extLst>
       <p:ext uri="{BB962C8B-B14F-4D97-AF65-F5344CB8AC3E}">
-        <p14:creationId xmlns:p14="http://schemas.microsoft.com/office/powerpoint/2010/main" val="1482647372"/>
+        <p14:creationId xmlns:p14="http://schemas.microsoft.com/office/powerpoint/2010/main" val="2345769107"/>
       </p:ext>
     </p:extLst>
   </p:cSld>
@@ -2795,7 +2795,7 @@
           <a:p>
             <a:fld id="{F8F920B2-3E99-4C9D-9450-62A3DEC5476B}" type="datetimeFigureOut">
               <a:rPr lang="en-US" smtClean="0"/>
-              <a:t>9/25/2017</a:t>
+              <a:t>10/12/2017</a:t>
             </a:fld>
             <a:endParaRPr lang="en-US"/>
           </a:p>
@@ -2846,7 +2846,7 @@
     </p:spTree>
     <p:extLst>
       <p:ext uri="{BB962C8B-B14F-4D97-AF65-F5344CB8AC3E}">
-        <p14:creationId xmlns:p14="http://schemas.microsoft.com/office/powerpoint/2010/main" val="3528985964"/>
+        <p14:creationId xmlns:p14="http://schemas.microsoft.com/office/powerpoint/2010/main" val="67573381"/>
       </p:ext>
     </p:extLst>
   </p:cSld>
@@ -3008,7 +3008,7 @@
           <a:p>
             <a:fld id="{F8F920B2-3E99-4C9D-9450-62A3DEC5476B}" type="datetimeFigureOut">
               <a:rPr lang="en-US" smtClean="0"/>
-              <a:t>9/25/2017</a:t>
+              <a:t>10/12/2017</a:t>
             </a:fld>
             <a:endParaRPr lang="en-US"/>
           </a:p>
@@ -3095,23 +3095,23 @@
     </p:spTree>
     <p:extLst>
       <p:ext uri="{BB962C8B-B14F-4D97-AF65-F5344CB8AC3E}">
-        <p14:creationId xmlns:p14="http://schemas.microsoft.com/office/powerpoint/2010/main" val="2346689605"/>
+        <p14:creationId xmlns:p14="http://schemas.microsoft.com/office/powerpoint/2010/main" val="2769721521"/>
       </p:ext>
     </p:extLst>
   </p:cSld>
   <p:clrMap bg1="lt1" tx1="dk1" bg2="lt2" tx2="dk2" accent1="accent1" accent2="accent2" accent3="accent3" accent4="accent4" accent5="accent5" accent6="accent6" hlink="hlink" folHlink="folHlink"/>
   <p:sldLayoutIdLst>
-    <p:sldLayoutId id="2147484430" r:id="rId1"/>
-    <p:sldLayoutId id="2147484431" r:id="rId2"/>
-    <p:sldLayoutId id="2147484432" r:id="rId3"/>
-    <p:sldLayoutId id="2147484433" r:id="rId4"/>
-    <p:sldLayoutId id="2147484434" r:id="rId5"/>
-    <p:sldLayoutId id="2147484435" r:id="rId6"/>
-    <p:sldLayoutId id="2147484436" r:id="rId7"/>
-    <p:sldLayoutId id="2147484437" r:id="rId8"/>
-    <p:sldLayoutId id="2147484438" r:id="rId9"/>
-    <p:sldLayoutId id="2147484439" r:id="rId10"/>
-    <p:sldLayoutId id="2147484440" r:id="rId11"/>
+    <p:sldLayoutId id="2147484454" r:id="rId1"/>
+    <p:sldLayoutId id="2147484455" r:id="rId2"/>
+    <p:sldLayoutId id="2147484456" r:id="rId3"/>
+    <p:sldLayoutId id="2147484457" r:id="rId4"/>
+    <p:sldLayoutId id="2147484458" r:id="rId5"/>
+    <p:sldLayoutId id="2147484459" r:id="rId6"/>
+    <p:sldLayoutId id="2147484460" r:id="rId7"/>
+    <p:sldLayoutId id="2147484461" r:id="rId8"/>
+    <p:sldLayoutId id="2147484462" r:id="rId9"/>
+    <p:sldLayoutId id="2147484463" r:id="rId10"/>
+    <p:sldLayoutId id="2147484464" r:id="rId11"/>
   </p:sldLayoutIdLst>
   <p:txStyles>
     <p:titleStyle>
@@ -3510,7 +3510,7 @@
           <a:p>
             <a:pPr algn="ctr"/>
             <a:r>
-              <a:rPr lang="en-US" sz="900" smtClean="0">
+              <a:rPr lang="en-US" sz="900">
                 <a:solidFill>
                   <a:srgbClr val="000000"/>
                 </a:solidFill>
@@ -3576,7 +3576,7 @@
         </p:nvSpPr>
         <p:spPr>
           <a:xfrm>
-            <a:off x="13868400" y="10439412"/>
+            <a:off x="13868400" y="10439414"/>
             <a:ext cx="304800" cy="304793"/>
           </a:xfrm>
           <a:prstGeom prst="rect">
@@ -3737,73 +3737,16 @@
           </a:p>
         </p:txBody>
       </p:sp>
-      <p:sp>
-        <p:nvSpPr>
-          <p:cNvPr id="187" name="Rectangle 186"/>
-          <p:cNvSpPr/>
-          <p:nvPr/>
-        </p:nvSpPr>
-        <p:spPr>
-          <a:xfrm>
-            <a:off x="7391400" y="10439400"/>
-            <a:ext cx="152400" cy="152400"/>
-          </a:xfrm>
-          <a:prstGeom prst="rect">
-            <a:avLst/>
-          </a:prstGeom>
-          <a:noFill/>
-          <a:ln>
-            <a:solidFill>
-              <a:schemeClr val="tx1"/>
-            </a:solidFill>
-          </a:ln>
-        </p:spPr>
-        <p:style>
-          <a:lnRef idx="2">
-            <a:schemeClr val="accent1">
-              <a:shade val="50000"/>
-            </a:schemeClr>
-          </a:lnRef>
-          <a:fillRef idx="1">
-            <a:schemeClr val="accent1"/>
-          </a:fillRef>
-          <a:effectRef idx="0">
-            <a:schemeClr val="accent1"/>
-          </a:effectRef>
-          <a:fontRef idx="minor">
-            <a:schemeClr val="lt1"/>
-          </a:fontRef>
-        </p:style>
-        <p:txBody>
-          <a:bodyPr wrap="square" lIns="45720" rIns="45720" rtlCol="0" anchor="ctr"/>
-          <a:lstStyle/>
-          <a:p>
-            <a:pPr algn="ctr"/>
-            <a:r>
-              <a:rPr lang="en-US" sz="900" dirty="0">
-                <a:solidFill>
-                  <a:srgbClr val="000000"/>
-                </a:solidFill>
-                <a:latin typeface="Courier New" panose="02070309020205020404" pitchFamily="49" charset="0"/>
-                <a:cs typeface="Courier New" panose="02070309020205020404" pitchFamily="49" charset="0"/>
-              </a:rPr>
-              <a:t>+</a:t>
-            </a:r>
-          </a:p>
-        </p:txBody>
-      </p:sp>
       <p:cxnSp>
         <p:nvCxnSpPr>
           <p:cNvPr id="188" name="Straight Connector 187"/>
-          <p:cNvCxnSpPr>
-            <a:endCxn id="187" idx="2"/>
-          </p:cNvCxnSpPr>
-          <p:nvPr/>
-        </p:nvCxnSpPr>
-        <p:spPr>
-          <a:xfrm flipV="1">
-            <a:off x="7467600" y="10591800"/>
-            <a:ext cx="0" cy="457200"/>
+          <p:cNvCxnSpPr/>
+          <p:nvPr/>
+        </p:nvCxnSpPr>
+        <p:spPr>
+          <a:xfrm>
+            <a:off x="5257800" y="10515600"/>
+            <a:ext cx="304800" cy="0"/>
           </a:xfrm>
           <a:prstGeom prst="line">
             <a:avLst/>
@@ -3831,115 +3774,6 @@
           </a:fontRef>
         </p:style>
       </p:cxnSp>
-      <p:sp>
-        <p:nvSpPr>
-          <p:cNvPr id="189" name="Rectangle 188"/>
-          <p:cNvSpPr/>
-          <p:nvPr/>
-        </p:nvSpPr>
-        <p:spPr>
-          <a:xfrm>
-            <a:off x="6781800" y="10363200"/>
-            <a:ext cx="457200" cy="152400"/>
-          </a:xfrm>
-          <a:prstGeom prst="rect">
-            <a:avLst/>
-          </a:prstGeom>
-          <a:noFill/>
-          <a:ln>
-            <a:noFill/>
-          </a:ln>
-        </p:spPr>
-        <p:style>
-          <a:lnRef idx="2">
-            <a:schemeClr val="accent1">
-              <a:shade val="50000"/>
-            </a:schemeClr>
-          </a:lnRef>
-          <a:fillRef idx="1">
-            <a:schemeClr val="accent1"/>
-          </a:fillRef>
-          <a:effectRef idx="0">
-            <a:schemeClr val="accent1"/>
-          </a:effectRef>
-          <a:fontRef idx="minor">
-            <a:schemeClr val="lt1"/>
-          </a:fontRef>
-        </p:style>
-        <p:txBody>
-          <a:bodyPr wrap="none" lIns="45720" rIns="45720" rtlCol="0" anchor="ctr"/>
-          <a:lstStyle/>
-          <a:p>
-            <a:pPr algn="r"/>
-            <a:r>
-              <a:rPr lang="en-US" sz="900" dirty="0" smtClean="0">
-                <a:solidFill>
-                  <a:srgbClr val="000000"/>
-                </a:solidFill>
-                <a:latin typeface="Courier New" panose="02070309020205020404" pitchFamily="49" charset="0"/>
-                <a:cs typeface="Courier New" panose="02070309020205020404" pitchFamily="49" charset="0"/>
-              </a:rPr>
-              <a:t>64</a:t>
-            </a:r>
-            <a:r>
-              <a:rPr lang="en-US" sz="900" dirty="0" smtClean="0">
-                <a:solidFill>
-                  <a:srgbClr val="000000"/>
-                </a:solidFill>
-                <a:latin typeface="Courier New" panose="02070309020205020404" pitchFamily="49" charset="0"/>
-                <a:cs typeface="Courier New" panose="02070309020205020404" pitchFamily="49" charset="0"/>
-              </a:rPr>
-              <a:t>’d1</a:t>
-            </a:r>
-            <a:endParaRPr lang="en-US" sz="900" dirty="0">
-              <a:solidFill>
-                <a:srgbClr val="000000"/>
-              </a:solidFill>
-              <a:latin typeface="Courier New" panose="02070309020205020404" pitchFamily="49" charset="0"/>
-              <a:cs typeface="Courier New" panose="02070309020205020404" pitchFamily="49" charset="0"/>
-            </a:endParaRPr>
-          </a:p>
-        </p:txBody>
-      </p:sp>
-      <p:cxnSp>
-        <p:nvCxnSpPr>
-          <p:cNvPr id="196" name="Straight Connector 195"/>
-          <p:cNvCxnSpPr>
-            <a:endCxn id="187" idx="1"/>
-          </p:cNvCxnSpPr>
-          <p:nvPr/>
-        </p:nvCxnSpPr>
-        <p:spPr>
-          <a:xfrm>
-            <a:off x="7086600" y="10515600"/>
-            <a:ext cx="304800" cy="0"/>
-          </a:xfrm>
-          <a:prstGeom prst="line">
-            <a:avLst/>
-          </a:prstGeom>
-          <a:ln w="12700">
-            <a:solidFill>
-              <a:srgbClr val="000000"/>
-            </a:solidFill>
-            <a:headEnd type="none" w="med" len="med"/>
-            <a:tailEnd type="triangle" w="med" len="med"/>
-          </a:ln>
-        </p:spPr>
-        <p:style>
-          <a:lnRef idx="1">
-            <a:schemeClr val="accent1"/>
-          </a:lnRef>
-          <a:fillRef idx="0">
-            <a:schemeClr val="accent1"/>
-          </a:fillRef>
-          <a:effectRef idx="0">
-            <a:schemeClr val="accent1"/>
-          </a:effectRef>
-          <a:fontRef idx="minor">
-            <a:schemeClr val="tx1"/>
-          </a:fontRef>
-        </p:style>
-      </p:cxnSp>
       <p:cxnSp>
         <p:nvCxnSpPr>
           <p:cNvPr id="207" name="Straight Connector 206"/>
@@ -3985,8 +3819,8 @@
         </p:nvCxnSpPr>
         <p:spPr>
           <a:xfrm flipH="1">
-            <a:off x="7467600" y="11049000"/>
-            <a:ext cx="7620000" cy="0"/>
+            <a:off x="5257800" y="11049000"/>
+            <a:ext cx="9829800" cy="0"/>
           </a:xfrm>
           <a:prstGeom prst="line">
             <a:avLst/>
@@ -4207,14 +4041,14 @@
         <p:nvCxnSpPr>
           <p:cNvPr id="135" name="Straight Connector 134"/>
           <p:cNvCxnSpPr>
-            <a:stCxn id="187" idx="3"/>
+            <a:stCxn id="489" idx="3"/>
           </p:cNvCxnSpPr>
           <p:nvPr/>
         </p:nvCxnSpPr>
         <p:spPr>
           <a:xfrm>
-            <a:off x="7543800" y="10515600"/>
-            <a:ext cx="457200" cy="0"/>
+            <a:off x="6477000" y="10515600"/>
+            <a:ext cx="1524000" cy="0"/>
           </a:xfrm>
           <a:prstGeom prst="line">
             <a:avLst/>
@@ -4291,7 +4125,7 @@
         </p:nvCxnSpPr>
         <p:spPr>
           <a:xfrm>
-            <a:off x="14173205" y="9144000"/>
+            <a:off x="14173207" y="9144000"/>
             <a:ext cx="1981199" cy="0"/>
           </a:xfrm>
           <a:prstGeom prst="line">
@@ -4702,7 +4536,7 @@
         </p:nvCxnSpPr>
         <p:spPr>
           <a:xfrm>
-            <a:off x="14173205" y="1295400"/>
+            <a:off x="14173207" y="1295400"/>
             <a:ext cx="1981199" cy="0"/>
           </a:xfrm>
           <a:prstGeom prst="line">
@@ -6185,7 +6019,7 @@
         </p:nvSpPr>
         <p:spPr>
           <a:xfrm>
-            <a:off x="13868400" y="2438412"/>
+            <a:off x="13868400" y="2438414"/>
             <a:ext cx="304800" cy="304793"/>
           </a:xfrm>
           <a:prstGeom prst="rect">
@@ -6852,7 +6686,7 @@
         </p:nvSpPr>
         <p:spPr>
           <a:xfrm rot="5400000">
-            <a:off x="5181604" y="3657605"/>
+            <a:off x="5181606" y="3657607"/>
             <a:ext cx="1523999" cy="1066799"/>
           </a:xfrm>
           <a:prstGeom prst="trapezoid">
@@ -7544,7 +7378,7 @@
         </p:nvSpPr>
         <p:spPr>
           <a:xfrm>
-            <a:off x="13868400" y="4267240"/>
+            <a:off x="13868400" y="4267242"/>
             <a:ext cx="304800" cy="304793"/>
           </a:xfrm>
           <a:prstGeom prst="rect">
@@ -11492,7 +11326,7 @@
           <a:lstStyle/>
           <a:p>
             <a:r>
-              <a:rPr lang="en-US" sz="900" dirty="0" smtClean="0">
+              <a:rPr lang="en-US" sz="900" dirty="0">
                 <a:solidFill>
                   <a:srgbClr val="000000"/>
                 </a:solidFill>
@@ -11501,13 +11335,6 @@
               </a:rPr>
               <a:t>10’d224</a:t>
             </a:r>
-            <a:endParaRPr lang="en-US" sz="900" dirty="0">
-              <a:solidFill>
-                <a:srgbClr val="000000"/>
-              </a:solidFill>
-              <a:latin typeface="Courier New" panose="02070309020205020404" pitchFamily="49" charset="0"/>
-              <a:cs typeface="Courier New" panose="02070309020205020404" pitchFamily="49" charset="0"/>
-            </a:endParaRPr>
           </a:p>
         </p:txBody>
       </p:sp>
@@ -11588,7 +11415,7 @@
           <a:lstStyle/>
           <a:p>
             <a:r>
-              <a:rPr lang="en-US" sz="900" dirty="0" smtClean="0">
+              <a:rPr lang="en-US" sz="900" dirty="0">
                 <a:solidFill>
                   <a:srgbClr val="000000"/>
                 </a:solidFill>
@@ -11597,13 +11424,6 @@
               </a:rPr>
               <a:t>10’d32</a:t>
             </a:r>
-            <a:endParaRPr lang="en-US" sz="900" dirty="0">
-              <a:solidFill>
-                <a:srgbClr val="000000"/>
-              </a:solidFill>
-              <a:latin typeface="Courier New" panose="02070309020205020404" pitchFamily="49" charset="0"/>
-              <a:cs typeface="Courier New" panose="02070309020205020404" pitchFamily="49" charset="0"/>
-            </a:endParaRPr>
           </a:p>
         </p:txBody>
       </p:sp>
@@ -11952,7 +11772,7 @@
           <a:p>
             <a:pPr algn="r"/>
             <a:r>
-              <a:rPr lang="en-US" sz="900" dirty="0" smtClean="0">
+              <a:rPr lang="en-US" sz="900" dirty="0">
                 <a:solidFill>
                   <a:srgbClr val="000000"/>
                 </a:solidFill>
@@ -11961,13 +11781,6 @@
               </a:rPr>
               <a:t>64’hAAAA_AAAA_AAAA_AAAA</a:t>
             </a:r>
-            <a:endParaRPr lang="en-US" sz="900" dirty="0">
-              <a:solidFill>
-                <a:srgbClr val="000000"/>
-              </a:solidFill>
-              <a:latin typeface="Courier New" panose="02070309020205020404" pitchFamily="49" charset="0"/>
-              <a:cs typeface="Courier New" panose="02070309020205020404" pitchFamily="49" charset="0"/>
-            </a:endParaRPr>
           </a:p>
         </p:txBody>
       </p:sp>
@@ -12012,32 +11825,15 @@
           <a:p>
             <a:pPr algn="r"/>
             <a:r>
-              <a:rPr lang="en-US" sz="900" dirty="0" smtClean="0">
+              <a:rPr lang="en-US" sz="900" dirty="0">
                 <a:solidFill>
                   <a:srgbClr val="000000"/>
                 </a:solidFill>
                 <a:latin typeface="Courier New" panose="02070309020205020404" pitchFamily="49" charset="0"/>
                 <a:cs typeface="Courier New" panose="02070309020205020404" pitchFamily="49" charset="0"/>
               </a:rPr>
-              <a:t>64</a:t>
-            </a:r>
-            <a:r>
-              <a:rPr lang="en-US" sz="900" dirty="0" smtClean="0">
-                <a:solidFill>
-                  <a:srgbClr val="000000"/>
-                </a:solidFill>
-                <a:latin typeface="Courier New" panose="02070309020205020404" pitchFamily="49" charset="0"/>
-                <a:cs typeface="Courier New" panose="02070309020205020404" pitchFamily="49" charset="0"/>
-              </a:rPr>
-              <a:t>’d0</a:t>
-            </a:r>
-            <a:endParaRPr lang="en-US" sz="900" dirty="0">
-              <a:solidFill>
-                <a:srgbClr val="000000"/>
-              </a:solidFill>
-              <a:latin typeface="Courier New" panose="02070309020205020404" pitchFamily="49" charset="0"/>
-              <a:cs typeface="Courier New" panose="02070309020205020404" pitchFamily="49" charset="0"/>
-            </a:endParaRPr>
+              <a:t>64’d0</a:t>
+            </a:r>
           </a:p>
         </p:txBody>
       </p:sp>
@@ -12049,7 +11845,7 @@
         </p:nvCxnSpPr>
         <p:spPr>
           <a:xfrm>
-            <a:off x="7696205" y="3124200"/>
+            <a:off x="7696207" y="3124200"/>
             <a:ext cx="1" cy="152400"/>
           </a:xfrm>
           <a:prstGeom prst="line">
@@ -12428,9 +12224,9 @@
           <p:nvPr/>
         </p:nvCxnSpPr>
         <p:spPr>
-          <a:xfrm>
-            <a:off x="7467600" y="10820400"/>
-            <a:ext cx="533400" cy="0"/>
+          <a:xfrm flipV="1">
+            <a:off x="7772400" y="10820400"/>
+            <a:ext cx="0" cy="228600"/>
           </a:xfrm>
           <a:prstGeom prst="line">
             <a:avLst/>
@@ -12466,7 +12262,7 @@
         </p:nvSpPr>
         <p:spPr>
           <a:xfrm rot="5400000">
-            <a:off x="11049005" y="8763005"/>
+            <a:off x="11049007" y="8763007"/>
             <a:ext cx="1523999" cy="1066799"/>
           </a:xfrm>
           <a:prstGeom prst="trapezoid">
@@ -12792,213 +12588,179 @@
           <a:p>
             <a:pPr algn="r"/>
             <a:r>
-              <a:rPr lang="en-US" sz="900" dirty="0" smtClean="0">
+              <a:rPr lang="en-US" sz="900" dirty="0">
                 <a:solidFill>
                   <a:srgbClr val="000000"/>
                 </a:solidFill>
                 <a:latin typeface="Courier New" panose="02070309020205020404" pitchFamily="49" charset="0"/>
                 <a:cs typeface="Courier New" panose="02070309020205020404" pitchFamily="49" charset="0"/>
               </a:rPr>
-              <a:t>64</a:t>
-            </a:r>
-            <a:r>
-              <a:rPr lang="en-US" sz="900" dirty="0" smtClean="0">
+              <a:t>64’hF731_8CEF_137F_FEC8</a:t>
+            </a:r>
+          </a:p>
+        </p:txBody>
+      </p:sp>
+      <p:cxnSp>
+        <p:nvCxnSpPr>
+          <p:cNvPr id="531" name="Straight Connector 530"/>
+          <p:cNvCxnSpPr/>
+          <p:nvPr/>
+        </p:nvCxnSpPr>
+        <p:spPr>
+          <a:xfrm flipV="1">
+            <a:off x="10972800" y="9601200"/>
+            <a:ext cx="0" cy="1066800"/>
+          </a:xfrm>
+          <a:prstGeom prst="line">
+            <a:avLst/>
+          </a:prstGeom>
+          <a:ln w="12700">
+            <a:solidFill>
+              <a:srgbClr val="000000"/>
+            </a:solidFill>
+            <a:headEnd type="oval" w="med" len="med"/>
+            <a:tailEnd type="none" w="med" len="med"/>
+          </a:ln>
+        </p:spPr>
+        <p:style>
+          <a:lnRef idx="1">
+            <a:schemeClr val="accent1"/>
+          </a:lnRef>
+          <a:fillRef idx="0">
+            <a:schemeClr val="accent1"/>
+          </a:fillRef>
+          <a:effectRef idx="0">
+            <a:schemeClr val="accent1"/>
+          </a:effectRef>
+          <a:fontRef idx="minor">
+            <a:schemeClr val="tx1"/>
+          </a:fontRef>
+        </p:style>
+      </p:cxnSp>
+      <p:cxnSp>
+        <p:nvCxnSpPr>
+          <p:cNvPr id="533" name="Straight Connector 532"/>
+          <p:cNvCxnSpPr/>
+          <p:nvPr/>
+        </p:nvCxnSpPr>
+        <p:spPr>
+          <a:xfrm flipH="1">
+            <a:off x="10972800" y="9601200"/>
+            <a:ext cx="304800" cy="0"/>
+          </a:xfrm>
+          <a:prstGeom prst="line">
+            <a:avLst/>
+          </a:prstGeom>
+          <a:ln w="12700">
+            <a:solidFill>
+              <a:srgbClr val="000000"/>
+            </a:solidFill>
+            <a:headEnd type="none" w="med" len="med"/>
+            <a:tailEnd type="none" w="med" len="med"/>
+          </a:ln>
+        </p:spPr>
+        <p:style>
+          <a:lnRef idx="1">
+            <a:schemeClr val="accent1"/>
+          </a:lnRef>
+          <a:fillRef idx="0">
+            <a:schemeClr val="accent1"/>
+          </a:fillRef>
+          <a:effectRef idx="0">
+            <a:schemeClr val="accent1"/>
+          </a:effectRef>
+          <a:fontRef idx="minor">
+            <a:schemeClr val="tx1"/>
+          </a:fontRef>
+        </p:style>
+      </p:cxnSp>
+      <p:cxnSp>
+        <p:nvCxnSpPr>
+          <p:cNvPr id="540" name="Straight Connector 539"/>
+          <p:cNvCxnSpPr/>
+          <p:nvPr/>
+        </p:nvCxnSpPr>
+        <p:spPr>
+          <a:xfrm flipH="1">
+            <a:off x="10515600" y="9906000"/>
+            <a:ext cx="762000" cy="0"/>
+          </a:xfrm>
+          <a:prstGeom prst="line">
+            <a:avLst/>
+          </a:prstGeom>
+          <a:ln w="12700">
+            <a:solidFill>
+              <a:srgbClr val="000000"/>
+            </a:solidFill>
+            <a:headEnd type="none" w="med" len="med"/>
+            <a:tailEnd type="none" w="med" len="med"/>
+          </a:ln>
+        </p:spPr>
+        <p:style>
+          <a:lnRef idx="1">
+            <a:schemeClr val="accent1"/>
+          </a:lnRef>
+          <a:fillRef idx="0">
+            <a:schemeClr val="accent1"/>
+          </a:fillRef>
+          <a:effectRef idx="0">
+            <a:schemeClr val="accent1"/>
+          </a:effectRef>
+          <a:fontRef idx="minor">
+            <a:schemeClr val="tx1"/>
+          </a:fontRef>
+        </p:style>
+      </p:cxnSp>
+      <p:sp>
+        <p:nvSpPr>
+          <p:cNvPr id="541" name="Rectangle 540"/>
+          <p:cNvSpPr/>
+          <p:nvPr/>
+        </p:nvSpPr>
+        <p:spPr>
+          <a:xfrm>
+            <a:off x="10210800" y="9753600"/>
+            <a:ext cx="457200" cy="152400"/>
+          </a:xfrm>
+          <a:prstGeom prst="rect">
+            <a:avLst/>
+          </a:prstGeom>
+          <a:noFill/>
+          <a:ln>
+            <a:noFill/>
+          </a:ln>
+        </p:spPr>
+        <p:style>
+          <a:lnRef idx="2">
+            <a:schemeClr val="accent1">
+              <a:shade val="50000"/>
+            </a:schemeClr>
+          </a:lnRef>
+          <a:fillRef idx="1">
+            <a:schemeClr val="accent1"/>
+          </a:fillRef>
+          <a:effectRef idx="0">
+            <a:schemeClr val="accent1"/>
+          </a:effectRef>
+          <a:fontRef idx="minor">
+            <a:schemeClr val="lt1"/>
+          </a:fontRef>
+        </p:style>
+        <p:txBody>
+          <a:bodyPr wrap="none" lIns="45720" rIns="45720" rtlCol="0" anchor="ctr"/>
+          <a:lstStyle/>
+          <a:p>
+            <a:pPr algn="r"/>
+            <a:r>
+              <a:rPr lang="en-US" sz="900" dirty="0">
                 <a:solidFill>
                   <a:srgbClr val="000000"/>
                 </a:solidFill>
                 <a:latin typeface="Courier New" panose="02070309020205020404" pitchFamily="49" charset="0"/>
                 <a:cs typeface="Courier New" panose="02070309020205020404" pitchFamily="49" charset="0"/>
               </a:rPr>
-              <a:t>’hF731_8CEF_137F_FEC8</a:t>
-            </a:r>
-            <a:endParaRPr lang="en-US" sz="900" dirty="0">
-              <a:solidFill>
-                <a:srgbClr val="000000"/>
-              </a:solidFill>
-              <a:latin typeface="Courier New" panose="02070309020205020404" pitchFamily="49" charset="0"/>
-              <a:cs typeface="Courier New" panose="02070309020205020404" pitchFamily="49" charset="0"/>
-            </a:endParaRPr>
-          </a:p>
-        </p:txBody>
-      </p:sp>
-      <p:cxnSp>
-        <p:nvCxnSpPr>
-          <p:cNvPr id="531" name="Straight Connector 530"/>
-          <p:cNvCxnSpPr/>
-          <p:nvPr/>
-        </p:nvCxnSpPr>
-        <p:spPr>
-          <a:xfrm flipV="1">
-            <a:off x="10972800" y="9601200"/>
-            <a:ext cx="0" cy="1066800"/>
-          </a:xfrm>
-          <a:prstGeom prst="line">
-            <a:avLst/>
-          </a:prstGeom>
-          <a:ln w="12700">
-            <a:solidFill>
-              <a:srgbClr val="000000"/>
-            </a:solidFill>
-            <a:headEnd type="oval" w="med" len="med"/>
-            <a:tailEnd type="none" w="med" len="med"/>
-          </a:ln>
-        </p:spPr>
-        <p:style>
-          <a:lnRef idx="1">
-            <a:schemeClr val="accent1"/>
-          </a:lnRef>
-          <a:fillRef idx="0">
-            <a:schemeClr val="accent1"/>
-          </a:fillRef>
-          <a:effectRef idx="0">
-            <a:schemeClr val="accent1"/>
-          </a:effectRef>
-          <a:fontRef idx="minor">
-            <a:schemeClr val="tx1"/>
-          </a:fontRef>
-        </p:style>
-      </p:cxnSp>
-      <p:cxnSp>
-        <p:nvCxnSpPr>
-          <p:cNvPr id="533" name="Straight Connector 532"/>
-          <p:cNvCxnSpPr/>
-          <p:nvPr/>
-        </p:nvCxnSpPr>
-        <p:spPr>
-          <a:xfrm flipH="1">
-            <a:off x="10972800" y="9601200"/>
-            <a:ext cx="304800" cy="0"/>
-          </a:xfrm>
-          <a:prstGeom prst="line">
-            <a:avLst/>
-          </a:prstGeom>
-          <a:ln w="12700">
-            <a:solidFill>
-              <a:srgbClr val="000000"/>
-            </a:solidFill>
-            <a:headEnd type="none" w="med" len="med"/>
-            <a:tailEnd type="none" w="med" len="med"/>
-          </a:ln>
-        </p:spPr>
-        <p:style>
-          <a:lnRef idx="1">
-            <a:schemeClr val="accent1"/>
-          </a:lnRef>
-          <a:fillRef idx="0">
-            <a:schemeClr val="accent1"/>
-          </a:fillRef>
-          <a:effectRef idx="0">
-            <a:schemeClr val="accent1"/>
-          </a:effectRef>
-          <a:fontRef idx="minor">
-            <a:schemeClr val="tx1"/>
-          </a:fontRef>
-        </p:style>
-      </p:cxnSp>
-      <p:cxnSp>
-        <p:nvCxnSpPr>
-          <p:cNvPr id="540" name="Straight Connector 539"/>
-          <p:cNvCxnSpPr/>
-          <p:nvPr/>
-        </p:nvCxnSpPr>
-        <p:spPr>
-          <a:xfrm flipH="1">
-            <a:off x="10515600" y="9906000"/>
-            <a:ext cx="762000" cy="0"/>
-          </a:xfrm>
-          <a:prstGeom prst="line">
-            <a:avLst/>
-          </a:prstGeom>
-          <a:ln w="12700">
-            <a:solidFill>
-              <a:srgbClr val="000000"/>
-            </a:solidFill>
-            <a:headEnd type="none" w="med" len="med"/>
-            <a:tailEnd type="none" w="med" len="med"/>
-          </a:ln>
-        </p:spPr>
-        <p:style>
-          <a:lnRef idx="1">
-            <a:schemeClr val="accent1"/>
-          </a:lnRef>
-          <a:fillRef idx="0">
-            <a:schemeClr val="accent1"/>
-          </a:fillRef>
-          <a:effectRef idx="0">
-            <a:schemeClr val="accent1"/>
-          </a:effectRef>
-          <a:fontRef idx="minor">
-            <a:schemeClr val="tx1"/>
-          </a:fontRef>
-        </p:style>
-      </p:cxnSp>
-      <p:sp>
-        <p:nvSpPr>
-          <p:cNvPr id="541" name="Rectangle 540"/>
-          <p:cNvSpPr/>
-          <p:nvPr/>
-        </p:nvSpPr>
-        <p:spPr>
-          <a:xfrm>
-            <a:off x="10210800" y="9753600"/>
-            <a:ext cx="457200" cy="152400"/>
-          </a:xfrm>
-          <a:prstGeom prst="rect">
-            <a:avLst/>
-          </a:prstGeom>
-          <a:noFill/>
-          <a:ln>
-            <a:noFill/>
-          </a:ln>
-        </p:spPr>
-        <p:style>
-          <a:lnRef idx="2">
-            <a:schemeClr val="accent1">
-              <a:shade val="50000"/>
-            </a:schemeClr>
-          </a:lnRef>
-          <a:fillRef idx="1">
-            <a:schemeClr val="accent1"/>
-          </a:fillRef>
-          <a:effectRef idx="0">
-            <a:schemeClr val="accent1"/>
-          </a:effectRef>
-          <a:fontRef idx="minor">
-            <a:schemeClr val="lt1"/>
-          </a:fontRef>
-        </p:style>
-        <p:txBody>
-          <a:bodyPr wrap="none" lIns="45720" rIns="45720" rtlCol="0" anchor="ctr"/>
-          <a:lstStyle/>
-          <a:p>
-            <a:pPr algn="r"/>
-            <a:r>
-              <a:rPr lang="en-US" sz="900" dirty="0" smtClean="0">
-                <a:solidFill>
-                  <a:srgbClr val="000000"/>
-                </a:solidFill>
-                <a:latin typeface="Courier New" panose="02070309020205020404" pitchFamily="49" charset="0"/>
-                <a:cs typeface="Courier New" panose="02070309020205020404" pitchFamily="49" charset="0"/>
-              </a:rPr>
-              <a:t>64</a:t>
-            </a:r>
-            <a:r>
-              <a:rPr lang="en-US" sz="900" dirty="0" smtClean="0">
-                <a:solidFill>
-                  <a:srgbClr val="000000"/>
-                </a:solidFill>
-                <a:latin typeface="Courier New" panose="02070309020205020404" pitchFamily="49" charset="0"/>
-                <a:cs typeface="Courier New" panose="02070309020205020404" pitchFamily="49" charset="0"/>
-              </a:rPr>
-              <a:t>’d0</a:t>
-            </a:r>
-            <a:endParaRPr lang="en-US" sz="900" dirty="0">
-              <a:solidFill>
-                <a:srgbClr val="000000"/>
-              </a:solidFill>
-              <a:latin typeface="Courier New" panose="02070309020205020404" pitchFamily="49" charset="0"/>
-              <a:cs typeface="Courier New" panose="02070309020205020404" pitchFamily="49" charset="0"/>
-            </a:endParaRPr>
+              <a:t>64’d0</a:t>
+            </a:r>
           </a:p>
         </p:txBody>
       </p:sp>
@@ -13010,7 +12772,7 @@
         </p:nvSpPr>
         <p:spPr>
           <a:xfrm>
-            <a:off x="13868400" y="9067805"/>
+            <a:off x="13868400" y="9067807"/>
             <a:ext cx="304800" cy="304793"/>
           </a:xfrm>
           <a:prstGeom prst="rect">
@@ -13181,7 +12943,7 @@
         </p:nvCxnSpPr>
         <p:spPr>
           <a:xfrm>
-            <a:off x="12344404" y="9296400"/>
+            <a:off x="12344406" y="9296400"/>
             <a:ext cx="1066801" cy="0"/>
           </a:xfrm>
           <a:prstGeom prst="line">
@@ -14096,7 +13858,7 @@
         </p:nvSpPr>
         <p:spPr>
           <a:xfrm>
-            <a:off x="13868400" y="1219205"/>
+            <a:off x="13868400" y="1219207"/>
             <a:ext cx="304800" cy="304793"/>
           </a:xfrm>
           <a:prstGeom prst="rect">
@@ -14337,7 +14099,7 @@
           <a:p>
             <a:pPr algn="ctr"/>
             <a:r>
-              <a:rPr lang="en-US" sz="900" dirty="0" smtClean="0">
+              <a:rPr lang="en-US" sz="900" dirty="0">
                 <a:solidFill>
                   <a:srgbClr val="000000"/>
                 </a:solidFill>
@@ -14346,13 +14108,6 @@
               </a:rPr>
               <a:t>64</a:t>
             </a:r>
-            <a:endParaRPr lang="en-US" sz="900" dirty="0">
-              <a:solidFill>
-                <a:srgbClr val="000000"/>
-              </a:solidFill>
-              <a:latin typeface="Courier New" panose="02070309020205020404" pitchFamily="49" charset="0"/>
-              <a:cs typeface="Courier New" panose="02070309020205020404" pitchFamily="49" charset="0"/>
-            </a:endParaRPr>
           </a:p>
         </p:txBody>
       </p:sp>
@@ -14434,7 +14189,7 @@
           <a:p>
             <a:pPr algn="ctr"/>
             <a:r>
-              <a:rPr lang="en-US" sz="900" dirty="0" smtClean="0">
+              <a:rPr lang="en-US" sz="900" dirty="0">
                 <a:solidFill>
                   <a:srgbClr val="000000"/>
                 </a:solidFill>
@@ -14443,13 +14198,6 @@
               </a:rPr>
               <a:t>64</a:t>
             </a:r>
-            <a:endParaRPr lang="en-US" sz="900" dirty="0">
-              <a:solidFill>
-                <a:srgbClr val="000000"/>
-              </a:solidFill>
-              <a:latin typeface="Courier New" panose="02070309020205020404" pitchFamily="49" charset="0"/>
-              <a:cs typeface="Courier New" panose="02070309020205020404" pitchFamily="49" charset="0"/>
-            </a:endParaRPr>
           </a:p>
         </p:txBody>
       </p:sp>
@@ -15523,7 +15271,7 @@
         </p:nvCxnSpPr>
         <p:spPr>
           <a:xfrm>
-            <a:off x="14173206" y="5715007"/>
+            <a:off x="14173208" y="5715007"/>
             <a:ext cx="1981199" cy="0"/>
           </a:xfrm>
           <a:prstGeom prst="line">
@@ -15649,7 +15397,7 @@
         </p:nvSpPr>
         <p:spPr>
           <a:xfrm>
-            <a:off x="13868401" y="5638812"/>
+            <a:off x="13868401" y="5638814"/>
             <a:ext cx="304800" cy="304793"/>
           </a:xfrm>
           <a:prstGeom prst="rect">
@@ -16270,32 +16018,15 @@
           <a:p>
             <a:pPr algn="r"/>
             <a:r>
-              <a:rPr lang="en-US" sz="900" dirty="0" smtClean="0">
+              <a:rPr lang="en-US" sz="900" dirty="0">
                 <a:solidFill>
                   <a:srgbClr val="000000"/>
                 </a:solidFill>
                 <a:latin typeface="Courier New" panose="02070309020205020404" pitchFamily="49" charset="0"/>
                 <a:cs typeface="Courier New" panose="02070309020205020404" pitchFamily="49" charset="0"/>
               </a:rPr>
-              <a:t>64</a:t>
-            </a:r>
-            <a:r>
-              <a:rPr lang="en-US" sz="900" dirty="0" smtClean="0">
-                <a:solidFill>
-                  <a:srgbClr val="000000"/>
-                </a:solidFill>
-                <a:latin typeface="Courier New" panose="02070309020205020404" pitchFamily="49" charset="0"/>
-                <a:cs typeface="Courier New" panose="02070309020205020404" pitchFamily="49" charset="0"/>
-              </a:rPr>
-              <a:t>’d0</a:t>
-            </a:r>
-            <a:endParaRPr lang="en-US" sz="900" dirty="0">
-              <a:solidFill>
-                <a:srgbClr val="000000"/>
-              </a:solidFill>
-              <a:latin typeface="Courier New" panose="02070309020205020404" pitchFamily="49" charset="0"/>
-              <a:cs typeface="Courier New" panose="02070309020205020404" pitchFamily="49" charset="0"/>
-            </a:endParaRPr>
+              <a:t>64’d0</a:t>
+            </a:r>
           </a:p>
         </p:txBody>
       </p:sp>
@@ -16529,32 +16260,15 @@
           <a:p>
             <a:pPr algn="r"/>
             <a:r>
-              <a:rPr lang="en-US" sz="900" dirty="0" smtClean="0">
+              <a:rPr lang="en-US" sz="900" dirty="0">
                 <a:solidFill>
                   <a:srgbClr val="000000"/>
                 </a:solidFill>
                 <a:latin typeface="Courier New" panose="02070309020205020404" pitchFamily="49" charset="0"/>
                 <a:cs typeface="Courier New" panose="02070309020205020404" pitchFamily="49" charset="0"/>
               </a:rPr>
-              <a:t>64</a:t>
-            </a:r>
-            <a:r>
-              <a:rPr lang="en-US" sz="900" dirty="0" smtClean="0">
-                <a:solidFill>
-                  <a:srgbClr val="000000"/>
-                </a:solidFill>
-                <a:latin typeface="Courier New" panose="02070309020205020404" pitchFamily="49" charset="0"/>
-                <a:cs typeface="Courier New" panose="02070309020205020404" pitchFamily="49" charset="0"/>
-              </a:rPr>
-              <a:t>’d0</a:t>
-            </a:r>
-            <a:endParaRPr lang="en-US" sz="900" dirty="0">
-              <a:solidFill>
-                <a:srgbClr val="000000"/>
-              </a:solidFill>
-              <a:latin typeface="Courier New" panose="02070309020205020404" pitchFamily="49" charset="0"/>
-              <a:cs typeface="Courier New" panose="02070309020205020404" pitchFamily="49" charset="0"/>
-            </a:endParaRPr>
+              <a:t>64’d0</a:t>
+            </a:r>
           </a:p>
         </p:txBody>
       </p:sp>
@@ -17147,7 +16861,7 @@
           <a:p>
             <a:pPr algn="r"/>
             <a:r>
-              <a:rPr lang="en-US" sz="900" dirty="0" smtClean="0">
+              <a:rPr lang="en-US" sz="900" dirty="0">
                 <a:solidFill>
                   <a:srgbClr val="000000"/>
                 </a:solidFill>
@@ -17156,13 +16870,6 @@
               </a:rPr>
               <a:t>10’d63</a:t>
             </a:r>
-            <a:endParaRPr lang="en-US" sz="900" dirty="0">
-              <a:solidFill>
-                <a:srgbClr val="000000"/>
-              </a:solidFill>
-              <a:latin typeface="Courier New" panose="02070309020205020404" pitchFamily="49" charset="0"/>
-              <a:cs typeface="Courier New" panose="02070309020205020404" pitchFamily="49" charset="0"/>
-            </a:endParaRPr>
           </a:p>
         </p:txBody>
       </p:sp>
@@ -18630,7 +18337,7 @@
         </p:nvSpPr>
         <p:spPr>
           <a:xfrm>
-            <a:off x="6324600" y="11658622"/>
+            <a:off x="6324600" y="11658624"/>
             <a:ext cx="304800" cy="304793"/>
           </a:xfrm>
           <a:prstGeom prst="rect">
@@ -19135,7 +18842,7 @@
         </p:nvSpPr>
         <p:spPr>
           <a:xfrm>
-            <a:off x="6324600" y="12115829"/>
+            <a:off x="6324600" y="12115831"/>
             <a:ext cx="304800" cy="304793"/>
           </a:xfrm>
           <a:prstGeom prst="rect">
@@ -19397,6 +19104,447 @@
               </a:rPr>
               <a:t>as low active asynchronous reset</a:t>
             </a:r>
+          </a:p>
+        </p:txBody>
+      </p:sp>
+      <p:cxnSp>
+        <p:nvCxnSpPr>
+          <p:cNvPr id="471" name="Straight Connector 470"/>
+          <p:cNvCxnSpPr/>
+          <p:nvPr/>
+        </p:nvCxnSpPr>
+        <p:spPr>
+          <a:xfrm>
+            <a:off x="7772400" y="10820400"/>
+            <a:ext cx="228600" cy="0"/>
+          </a:xfrm>
+          <a:prstGeom prst="line">
+            <a:avLst/>
+          </a:prstGeom>
+          <a:ln w="12700">
+            <a:solidFill>
+              <a:srgbClr val="000000"/>
+            </a:solidFill>
+            <a:headEnd type="none" w="med" len="med"/>
+            <a:tailEnd type="none" w="med" len="med"/>
+          </a:ln>
+        </p:spPr>
+        <p:style>
+          <a:lnRef idx="1">
+            <a:schemeClr val="accent1"/>
+          </a:lnRef>
+          <a:fillRef idx="0">
+            <a:schemeClr val="accent1"/>
+          </a:fillRef>
+          <a:effectRef idx="0">
+            <a:schemeClr val="accent1"/>
+          </a:effectRef>
+          <a:fontRef idx="minor">
+            <a:schemeClr val="tx1"/>
+          </a:fontRef>
+        </p:style>
+      </p:cxnSp>
+      <p:sp>
+        <p:nvSpPr>
+          <p:cNvPr id="481" name="Rectangle 480"/>
+          <p:cNvSpPr/>
+          <p:nvPr/>
+        </p:nvSpPr>
+        <p:spPr>
+          <a:xfrm>
+            <a:off x="5562600" y="10210800"/>
+            <a:ext cx="914400" cy="457200"/>
+          </a:xfrm>
+          <a:prstGeom prst="rect">
+            <a:avLst/>
+          </a:prstGeom>
+          <a:noFill/>
+          <a:ln w="12700">
+            <a:solidFill>
+              <a:srgbClr val="000000"/>
+            </a:solidFill>
+          </a:ln>
+        </p:spPr>
+        <p:style>
+          <a:lnRef idx="2">
+            <a:schemeClr val="accent1">
+              <a:shade val="50000"/>
+            </a:schemeClr>
+          </a:lnRef>
+          <a:fillRef idx="1">
+            <a:schemeClr val="accent1"/>
+          </a:fillRef>
+          <a:effectRef idx="0">
+            <a:schemeClr val="accent1"/>
+          </a:effectRef>
+          <a:fontRef idx="minor">
+            <a:schemeClr val="lt1"/>
+          </a:fontRef>
+        </p:style>
+        <p:txBody>
+          <a:bodyPr lIns="45720" rIns="45720" rtlCol="0" anchor="t"/>
+          <a:lstStyle/>
+          <a:p>
+            <a:r>
+              <a:rPr lang="en-US" sz="900" dirty="0">
+                <a:solidFill>
+                  <a:schemeClr val="tx1"/>
+                </a:solidFill>
+                <a:latin typeface="Courier New" panose="02070309020205020404" pitchFamily="49" charset="0"/>
+                <a:cs typeface="Courier New" panose="02070309020205020404" pitchFamily="49" charset="0"/>
+              </a:rPr>
+              <a:t>lfsr32x2</a:t>
+            </a:r>
+          </a:p>
+        </p:txBody>
+      </p:sp>
+      <p:sp>
+        <p:nvSpPr>
+          <p:cNvPr id="486" name="Rectangle 485"/>
+          <p:cNvSpPr/>
+          <p:nvPr/>
+        </p:nvSpPr>
+        <p:spPr>
+          <a:xfrm>
+            <a:off x="5562600" y="10439400"/>
+            <a:ext cx="457200" cy="152400"/>
+          </a:xfrm>
+          <a:prstGeom prst="rect">
+            <a:avLst/>
+          </a:prstGeom>
+          <a:noFill/>
+          <a:ln>
+            <a:noFill/>
+          </a:ln>
+        </p:spPr>
+        <p:style>
+          <a:lnRef idx="2">
+            <a:schemeClr val="accent1">
+              <a:shade val="50000"/>
+            </a:schemeClr>
+          </a:lnRef>
+          <a:fillRef idx="1">
+            <a:schemeClr val="accent1"/>
+          </a:fillRef>
+          <a:effectRef idx="0">
+            <a:schemeClr val="accent1"/>
+          </a:effectRef>
+          <a:fontRef idx="minor">
+            <a:schemeClr val="lt1"/>
+          </a:fontRef>
+        </p:style>
+        <p:txBody>
+          <a:bodyPr wrap="none" lIns="45720" rIns="45720" rtlCol="0" anchor="ctr"/>
+          <a:lstStyle/>
+          <a:p>
+            <a:r>
+              <a:rPr lang="en-US" sz="900" dirty="0">
+                <a:solidFill>
+                  <a:srgbClr val="000000"/>
+                </a:solidFill>
+                <a:latin typeface="Courier New" panose="02070309020205020404" pitchFamily="49" charset="0"/>
+                <a:cs typeface="Courier New" panose="02070309020205020404" pitchFamily="49" charset="0"/>
+              </a:rPr>
+              <a:t>DIN</a:t>
+            </a:r>
+          </a:p>
+        </p:txBody>
+      </p:sp>
+      <p:sp>
+        <p:nvSpPr>
+          <p:cNvPr id="489" name="Rectangle 488"/>
+          <p:cNvSpPr/>
+          <p:nvPr/>
+        </p:nvSpPr>
+        <p:spPr>
+          <a:xfrm>
+            <a:off x="6019800" y="10439400"/>
+            <a:ext cx="457200" cy="152400"/>
+          </a:xfrm>
+          <a:prstGeom prst="rect">
+            <a:avLst/>
+          </a:prstGeom>
+          <a:noFill/>
+          <a:ln>
+            <a:noFill/>
+          </a:ln>
+        </p:spPr>
+        <p:style>
+          <a:lnRef idx="2">
+            <a:schemeClr val="accent1">
+              <a:shade val="50000"/>
+            </a:schemeClr>
+          </a:lnRef>
+          <a:fillRef idx="1">
+            <a:schemeClr val="accent1"/>
+          </a:fillRef>
+          <a:effectRef idx="0">
+            <a:schemeClr val="accent1"/>
+          </a:effectRef>
+          <a:fontRef idx="minor">
+            <a:schemeClr val="lt1"/>
+          </a:fontRef>
+        </p:style>
+        <p:txBody>
+          <a:bodyPr wrap="none" lIns="45720" rIns="45720" rtlCol="0" anchor="ctr"/>
+          <a:lstStyle/>
+          <a:p>
+            <a:pPr algn="r"/>
+            <a:r>
+              <a:rPr lang="en-US" sz="900" dirty="0">
+                <a:solidFill>
+                  <a:srgbClr val="000000"/>
+                </a:solidFill>
+                <a:latin typeface="Courier New" panose="02070309020205020404" pitchFamily="49" charset="0"/>
+                <a:cs typeface="Courier New" panose="02070309020205020404" pitchFamily="49" charset="0"/>
+              </a:rPr>
+              <a:t>DOUT</a:t>
+            </a:r>
+          </a:p>
+        </p:txBody>
+      </p:sp>
+      <p:cxnSp>
+        <p:nvCxnSpPr>
+          <p:cNvPr id="491" name="Straight Connector 490"/>
+          <p:cNvCxnSpPr/>
+          <p:nvPr/>
+        </p:nvCxnSpPr>
+        <p:spPr>
+          <a:xfrm flipV="1">
+            <a:off x="5257800" y="10515600"/>
+            <a:ext cx="0" cy="533400"/>
+          </a:xfrm>
+          <a:prstGeom prst="line">
+            <a:avLst/>
+          </a:prstGeom>
+          <a:ln w="12700">
+            <a:solidFill>
+              <a:srgbClr val="000000"/>
+            </a:solidFill>
+            <a:headEnd type="none" w="med" len="med"/>
+            <a:tailEnd type="none" w="med" len="med"/>
+          </a:ln>
+        </p:spPr>
+        <p:style>
+          <a:lnRef idx="1">
+            <a:schemeClr val="accent1"/>
+          </a:lnRef>
+          <a:fillRef idx="0">
+            <a:schemeClr val="accent1"/>
+          </a:fillRef>
+          <a:effectRef idx="0">
+            <a:schemeClr val="accent1"/>
+          </a:effectRef>
+          <a:fontRef idx="minor">
+            <a:schemeClr val="tx1"/>
+          </a:fontRef>
+        </p:style>
+      </p:cxnSp>
+      <p:cxnSp>
+        <p:nvCxnSpPr>
+          <p:cNvPr id="492" name="Straight Connector 491"/>
+          <p:cNvCxnSpPr/>
+          <p:nvPr/>
+        </p:nvCxnSpPr>
+        <p:spPr>
+          <a:xfrm flipV="1">
+            <a:off x="6553200" y="10439400"/>
+            <a:ext cx="152400" cy="152404"/>
+          </a:xfrm>
+          <a:prstGeom prst="line">
+            <a:avLst/>
+          </a:prstGeom>
+          <a:ln w="12700">
+            <a:solidFill>
+              <a:srgbClr val="000000"/>
+            </a:solidFill>
+            <a:headEnd type="none" w="med" len="med"/>
+            <a:tailEnd type="none" w="med" len="med"/>
+          </a:ln>
+        </p:spPr>
+        <p:style>
+          <a:lnRef idx="1">
+            <a:schemeClr val="accent1"/>
+          </a:lnRef>
+          <a:fillRef idx="0">
+            <a:schemeClr val="accent1"/>
+          </a:fillRef>
+          <a:effectRef idx="0">
+            <a:schemeClr val="accent1"/>
+          </a:effectRef>
+          <a:fontRef idx="minor">
+            <a:schemeClr val="tx1"/>
+          </a:fontRef>
+        </p:style>
+      </p:cxnSp>
+      <p:sp>
+        <p:nvSpPr>
+          <p:cNvPr id="493" name="Rectangle 492"/>
+          <p:cNvSpPr/>
+          <p:nvPr/>
+        </p:nvSpPr>
+        <p:spPr>
+          <a:xfrm>
+            <a:off x="6553201" y="10363200"/>
+            <a:ext cx="152400" cy="76200"/>
+          </a:xfrm>
+          <a:prstGeom prst="rect">
+            <a:avLst/>
+          </a:prstGeom>
+          <a:noFill/>
+          <a:ln>
+            <a:noFill/>
+          </a:ln>
+        </p:spPr>
+        <p:style>
+          <a:lnRef idx="2">
+            <a:schemeClr val="accent1">
+              <a:shade val="50000"/>
+            </a:schemeClr>
+          </a:lnRef>
+          <a:fillRef idx="1">
+            <a:schemeClr val="accent1"/>
+          </a:fillRef>
+          <a:effectRef idx="0">
+            <a:schemeClr val="accent1"/>
+          </a:effectRef>
+          <a:fontRef idx="minor">
+            <a:schemeClr val="lt1"/>
+          </a:fontRef>
+        </p:style>
+        <p:txBody>
+          <a:bodyPr wrap="none" lIns="45720" rIns="45720" rtlCol="0" anchor="ctr"/>
+          <a:lstStyle/>
+          <a:p>
+            <a:pPr algn="ctr"/>
+            <a:r>
+              <a:rPr lang="en-US" sz="900" dirty="0">
+                <a:solidFill>
+                  <a:srgbClr val="000000"/>
+                </a:solidFill>
+                <a:latin typeface="Courier New" panose="02070309020205020404" pitchFamily="49" charset="0"/>
+                <a:cs typeface="Courier New" panose="02070309020205020404" pitchFamily="49" charset="0"/>
+              </a:rPr>
+              <a:t>64</a:t>
+            </a:r>
+          </a:p>
+        </p:txBody>
+      </p:sp>
+      <p:sp>
+        <p:nvSpPr>
+          <p:cNvPr id="495" name="Rectangle 494"/>
+          <p:cNvSpPr/>
+          <p:nvPr/>
+        </p:nvSpPr>
+        <p:spPr>
+          <a:xfrm>
+            <a:off x="6781800" y="10363200"/>
+            <a:ext cx="457200" cy="152400"/>
+          </a:xfrm>
+          <a:prstGeom prst="rect">
+            <a:avLst/>
+          </a:prstGeom>
+          <a:noFill/>
+          <a:ln>
+            <a:noFill/>
+          </a:ln>
+        </p:spPr>
+        <p:style>
+          <a:lnRef idx="2">
+            <a:schemeClr val="accent1">
+              <a:shade val="50000"/>
+            </a:schemeClr>
+          </a:lnRef>
+          <a:fillRef idx="1">
+            <a:schemeClr val="accent1"/>
+          </a:fillRef>
+          <a:effectRef idx="0">
+            <a:schemeClr val="accent1"/>
+          </a:effectRef>
+          <a:fontRef idx="minor">
+            <a:schemeClr val="lt1"/>
+          </a:fontRef>
+        </p:style>
+        <p:txBody>
+          <a:bodyPr wrap="none" lIns="45720" rIns="45720" rtlCol="0" anchor="ctr"/>
+          <a:lstStyle/>
+          <a:p>
+            <a:r>
+              <a:rPr lang="en-US" sz="900" dirty="0" err="1">
+                <a:solidFill>
+                  <a:srgbClr val="000000"/>
+                </a:solidFill>
+                <a:latin typeface="Courier New" panose="02070309020205020404" pitchFamily="49" charset="0"/>
+                <a:cs typeface="Courier New" panose="02070309020205020404" pitchFamily="49" charset="0"/>
+              </a:rPr>
+              <a:t>test_data_inc</a:t>
+            </a:r>
+            <a:endParaRPr lang="en-US" sz="900" dirty="0">
+              <a:solidFill>
+                <a:srgbClr val="000000"/>
+              </a:solidFill>
+              <a:latin typeface="Courier New" panose="02070309020205020404" pitchFamily="49" charset="0"/>
+              <a:cs typeface="Courier New" panose="02070309020205020404" pitchFamily="49" charset="0"/>
+            </a:endParaRPr>
+          </a:p>
+        </p:txBody>
+      </p:sp>
+      <p:sp>
+        <p:nvSpPr>
+          <p:cNvPr id="438" name="Rectangle 437"/>
+          <p:cNvSpPr/>
+          <p:nvPr/>
+        </p:nvSpPr>
+        <p:spPr>
+          <a:xfrm>
+            <a:off x="5562600" y="10058400"/>
+            <a:ext cx="457200" cy="152400"/>
+          </a:xfrm>
+          <a:prstGeom prst="rect">
+            <a:avLst/>
+          </a:prstGeom>
+          <a:noFill/>
+          <a:ln>
+            <a:noFill/>
+          </a:ln>
+        </p:spPr>
+        <p:style>
+          <a:lnRef idx="2">
+            <a:schemeClr val="accent1">
+              <a:shade val="50000"/>
+            </a:schemeClr>
+          </a:lnRef>
+          <a:fillRef idx="1">
+            <a:schemeClr val="accent1"/>
+          </a:fillRef>
+          <a:effectRef idx="0">
+            <a:schemeClr val="accent1"/>
+          </a:effectRef>
+          <a:fontRef idx="minor">
+            <a:schemeClr val="lt1"/>
+          </a:fontRef>
+        </p:style>
+        <p:txBody>
+          <a:bodyPr wrap="none" lIns="45720" rIns="45720" rtlCol="0" anchor="ctr"/>
+          <a:lstStyle/>
+          <a:p>
+            <a:r>
+              <a:rPr lang="en-US" sz="900" dirty="0" smtClean="0">
+                <a:solidFill>
+                  <a:srgbClr val="000000"/>
+                </a:solidFill>
+                <a:latin typeface="Courier New" panose="02070309020205020404" pitchFamily="49" charset="0"/>
+                <a:cs typeface="Courier New" panose="02070309020205020404" pitchFamily="49" charset="0"/>
+              </a:rPr>
+              <a:t>i_lfsr32x2</a:t>
+            </a:r>
+            <a:endParaRPr lang="en-US" sz="900" dirty="0">
+              <a:solidFill>
+                <a:srgbClr val="000000"/>
+              </a:solidFill>
+              <a:latin typeface="Courier New" panose="02070309020205020404" pitchFamily="49" charset="0"/>
+              <a:cs typeface="Courier New" panose="02070309020205020404" pitchFamily="49" charset="0"/>
+            </a:endParaRPr>
           </a:p>
         </p:txBody>
       </p:sp>

</xml_diff>